<commit_message>
Update final presentation and ER diagram
</commit_message>
<xml_diff>
--- a/documentation/final_presentation/JobSearchEngine_FinalPresentation.pptx
+++ b/documentation/final_presentation/JobSearchEngine_FinalPresentation.pptx
@@ -1629,7 +1629,8 @@
               <a:buNone/>
             </a:pPr>
             <a:r>
-              <a:t/>
+              <a:rPr lang="en"/>
+              <a:t>Chris</a:t>
             </a:r>
             <a:endParaRPr/>
           </a:p>
@@ -9603,7 +9604,7 @@
             <a:tbl>
               <a:tblPr>
                 <a:noFill/>
-                <a:tableStyleId>{8282977A-9207-432A-90A8-4523B4F7A6BC}</a:tableStyleId>
+                <a:tableStyleId>{A13B3161-F745-4965-9370-0381F0E55C69}</a:tableStyleId>
               </a:tblPr>
               <a:tblGrid>
                 <a:gridCol w="2465500"/>
@@ -12527,7 +12528,7 @@
       </p:sp>
       <p:pic>
         <p:nvPicPr>
-          <p:cNvPr id="129" name="Google Shape;129;p22" title="JobSearchEngine_ERDiagram.png"/>
+          <p:cNvPr id="129" name="Google Shape;129;p22" title="CS 475 Database Schema (1).png"/>
           <p:cNvPicPr preferRelativeResize="0"/>
           <p:nvPr/>
         </p:nvPicPr>
@@ -12541,8 +12542,8 @@
         </p:blipFill>
         <p:spPr>
           <a:xfrm>
-            <a:off x="3945675" y="658538"/>
-            <a:ext cx="5075476" cy="3826426"/>
+            <a:off x="3945700" y="658544"/>
+            <a:ext cx="5075451" cy="3826414"/>
           </a:xfrm>
           <a:prstGeom prst="rect">
             <a:avLst/>

</xml_diff>